<commit_message>
pullup on last page is for pin 8 DPIN_LOCK_LOAD
</commit_message>
<xml_diff>
--- a/FOOF_RBG_Wiring.pptx
+++ b/FOOF_RBG_Wiring.pptx
@@ -272,7 +272,7 @@
           <a:p>
             <a:fld id="{02AC24A9-CCB6-4F8D-B8DB-C2F3692CFA5A}" type="datetimeFigureOut">
               <a:rPr lang="en-US" smtClean="0"/>
-              <a:t>3/22/2020</a:t>
+              <a:t>7/18/2020</a:t>
             </a:fld>
             <a:endParaRPr lang="en-US" dirty="0"/>
           </a:p>
@@ -642,7 +642,7 @@
           <a:p>
             <a:fld id="{02AC24A9-CCB6-4F8D-B8DB-C2F3692CFA5A}" type="datetimeFigureOut">
               <a:rPr lang="en-US" smtClean="0"/>
-              <a:t>3/22/2020</a:t>
+              <a:t>7/18/2020</a:t>
             </a:fld>
             <a:endParaRPr lang="en-US"/>
           </a:p>
@@ -851,7 +851,7 @@
           <a:p>
             <a:fld id="{02AC24A9-CCB6-4F8D-B8DB-C2F3692CFA5A}" type="datetimeFigureOut">
               <a:rPr lang="en-US" smtClean="0"/>
-              <a:t>3/22/2020</a:t>
+              <a:t>7/18/2020</a:t>
             </a:fld>
             <a:endParaRPr lang="en-US"/>
           </a:p>
@@ -1321,7 +1321,7 @@
           <a:p>
             <a:fld id="{02AC24A9-CCB6-4F8D-B8DB-C2F3692CFA5A}" type="datetimeFigureOut">
               <a:rPr lang="en-US" smtClean="0"/>
-              <a:t>3/22/2020</a:t>
+              <a:t>7/18/2020</a:t>
             </a:fld>
             <a:endParaRPr lang="en-US"/>
           </a:p>
@@ -1775,7 +1775,7 @@
           <a:p>
             <a:fld id="{02AC24A9-CCB6-4F8D-B8DB-C2F3692CFA5A}" type="datetimeFigureOut">
               <a:rPr lang="en-US" smtClean="0"/>
-              <a:t>3/22/2020</a:t>
+              <a:t>7/18/2020</a:t>
             </a:fld>
             <a:endParaRPr lang="en-US"/>
           </a:p>
@@ -2307,7 +2307,7 @@
           <a:p>
             <a:fld id="{02AC24A9-CCB6-4F8D-B8DB-C2F3692CFA5A}" type="datetimeFigureOut">
               <a:rPr lang="en-US" smtClean="0"/>
-              <a:t>3/22/2020</a:t>
+              <a:t>7/18/2020</a:t>
             </a:fld>
             <a:endParaRPr lang="en-US"/>
           </a:p>
@@ -3006,7 +3006,7 @@
           <a:p>
             <a:fld id="{02AC24A9-CCB6-4F8D-B8DB-C2F3692CFA5A}" type="datetimeFigureOut">
               <a:rPr lang="en-US" smtClean="0"/>
-              <a:t>3/22/2020</a:t>
+              <a:t>7/18/2020</a:t>
             </a:fld>
             <a:endParaRPr lang="en-US"/>
           </a:p>
@@ -3335,7 +3335,7 @@
           <a:p>
             <a:fld id="{02AC24A9-CCB6-4F8D-B8DB-C2F3692CFA5A}" type="datetimeFigureOut">
               <a:rPr lang="en-US" smtClean="0"/>
-              <a:t>3/22/2020</a:t>
+              <a:t>7/18/2020</a:t>
             </a:fld>
             <a:endParaRPr lang="en-US"/>
           </a:p>
@@ -3448,7 +3448,7 @@
           <a:p>
             <a:fld id="{02AC24A9-CCB6-4F8D-B8DB-C2F3692CFA5A}" type="datetimeFigureOut">
               <a:rPr lang="en-US" smtClean="0"/>
-              <a:t>3/22/2020</a:t>
+              <a:t>7/18/2020</a:t>
             </a:fld>
             <a:endParaRPr lang="en-US"/>
           </a:p>
@@ -3943,7 +3943,7 @@
           <a:p>
             <a:fld id="{02AC24A9-CCB6-4F8D-B8DB-C2F3692CFA5A}" type="datetimeFigureOut">
               <a:rPr lang="en-US" smtClean="0"/>
-              <a:t>3/22/2020</a:t>
+              <a:t>7/18/2020</a:t>
             </a:fld>
             <a:endParaRPr lang="en-US" dirty="0"/>
           </a:p>
@@ -4420,7 +4420,7 @@
           <a:p>
             <a:fld id="{02AC24A9-CCB6-4F8D-B8DB-C2F3692CFA5A}" type="datetimeFigureOut">
               <a:rPr lang="en-US" smtClean="0"/>
-              <a:t>3/22/2020</a:t>
+              <a:t>7/18/2020</a:t>
             </a:fld>
             <a:endParaRPr lang="en-US"/>
           </a:p>
@@ -4663,7 +4663,7 @@
           <a:p>
             <a:fld id="{02AC24A9-CCB6-4F8D-B8DB-C2F3692CFA5A}" type="datetimeFigureOut">
               <a:rPr lang="en-US" smtClean="0"/>
-              <a:t>3/22/2020</a:t>
+              <a:t>7/18/2020</a:t>
             </a:fld>
             <a:endParaRPr lang="en-US"/>
           </a:p>
@@ -14263,14 +14263,14 @@
           </p:cNvPr>
           <p:cNvCxnSpPr>
             <a:cxnSpLocks/>
-            <a:stCxn id="58" idx="7"/>
+            <a:stCxn id="57" idx="7"/>
           </p:cNvCxnSpPr>
           <p:nvPr/>
         </p:nvCxnSpPr>
         <p:spPr>
           <a:xfrm flipV="1">
-            <a:off x="10528620" y="5201324"/>
-            <a:ext cx="132607" cy="500380"/>
+            <a:off x="9994142" y="5201325"/>
+            <a:ext cx="667085" cy="201762"/>
           </a:xfrm>
           <a:prstGeom prst="line">
             <a:avLst/>

</xml_diff>